<commit_message>
Paste the image and made the final adjustment
</commit_message>
<xml_diff>
--- a/PBL/インターン報告会/インターン報告.pptx
+++ b/PBL/インターン報告会/インターン報告.pptx
@@ -5,17 +5,21 @@
     <p:sldMasterId id="2147483918" r:id="rId1"/>
   </p:sldMasterIdLst>
   <p:notesMasterIdLst>
-    <p:notesMasterId r:id="rId7"/>
+    <p:notesMasterId r:id="rId11"/>
   </p:notesMasterIdLst>
   <p:handoutMasterIdLst>
-    <p:handoutMasterId r:id="rId8"/>
+    <p:handoutMasterId r:id="rId12"/>
   </p:handoutMasterIdLst>
   <p:sldIdLst>
     <p:sldId id="258" r:id="rId2"/>
     <p:sldId id="392" r:id="rId3"/>
     <p:sldId id="393" r:id="rId4"/>
-    <p:sldId id="395" r:id="rId5"/>
-    <p:sldId id="394" r:id="rId6"/>
+    <p:sldId id="396" r:id="rId5"/>
+    <p:sldId id="397" r:id="rId6"/>
+    <p:sldId id="395" r:id="rId7"/>
+    <p:sldId id="398" r:id="rId8"/>
+    <p:sldId id="399" r:id="rId9"/>
+    <p:sldId id="394" r:id="rId10"/>
   </p:sldIdLst>
   <p:sldSz cx="9144000" cy="6858000" type="screen4x3"/>
   <p:notesSz cx="6858000" cy="9144000"/>
@@ -869,7 +873,7 @@
           <a:p>
             <a:fld id="{67A2FAF2-399E-7647-B872-8A96BB62A2B7}" type="slidenum">
               <a:rPr kumimoji="1" lang="ja-JP" altLang="en-US" smtClean="0"/>
-              <a:t>3</a:t>
+              <a:t>1</a:t>
             </a:fld>
             <a:endParaRPr kumimoji="1" lang="ja-JP" altLang="en-US"/>
           </a:p>
@@ -878,7 +882,7 @@
     </p:spTree>
     <p:extLst>
       <p:ext uri="{BB962C8B-B14F-4D97-AF65-F5344CB8AC3E}">
-        <p14:creationId xmlns:p14="http://schemas.microsoft.com/office/powerpoint/2010/main" val="185755899"/>
+        <p14:creationId xmlns:p14="http://schemas.microsoft.com/office/powerpoint/2010/main" val="549703794"/>
       </p:ext>
     </p:extLst>
   </p:cSld>
@@ -932,6 +936,92 @@
           <a:bodyPr/>
           <a:lstStyle/>
           <a:p>
+            <a:pPr marL="0" marR="0" lvl="1" indent="0" algn="l" defTabSz="914400" rtl="0" eaLnBrk="1" fontAlgn="auto" latinLnBrk="0" hangingPunct="1">
+              <a:lnSpc>
+                <a:spcPct val="100000"/>
+              </a:lnSpc>
+              <a:spcBef>
+                <a:spcPts val="0"/>
+              </a:spcBef>
+              <a:spcAft>
+                <a:spcPts val="0"/>
+              </a:spcAft>
+              <a:buClrTx/>
+              <a:buSzTx/>
+              <a:buFontTx/>
+              <a:buNone/>
+              <a:tabLst/>
+              <a:defRPr/>
+            </a:pPr>
+            <a:r>
+              <a:rPr lang="en-US" altLang="ja-JP" dirty="0" smtClean="0"/>
+              <a:t>[https://</a:t>
+            </a:r>
+            <a:r>
+              <a:rPr lang="en-US" altLang="ja-JP" dirty="0" err="1" smtClean="0"/>
+              <a:t>makecode.com</a:t>
+            </a:r>
+            <a:r>
+              <a:rPr lang="en-US" altLang="ja-JP" dirty="0" smtClean="0"/>
+              <a:t>]</a:t>
+            </a:r>
+          </a:p>
+          <a:p>
+            <a:pPr marL="0" marR="0" lvl="1" indent="0" algn="l" defTabSz="914400" rtl="0" eaLnBrk="1" fontAlgn="auto" latinLnBrk="0" hangingPunct="1">
+              <a:lnSpc>
+                <a:spcPct val="100000"/>
+              </a:lnSpc>
+              <a:spcBef>
+                <a:spcPts val="0"/>
+              </a:spcBef>
+              <a:spcAft>
+                <a:spcPts val="0"/>
+              </a:spcAft>
+              <a:buClrTx/>
+              <a:buSzTx/>
+              <a:buFontTx/>
+              <a:buNone/>
+              <a:tabLst/>
+              <a:defRPr/>
+            </a:pPr>
+            <a:r>
+              <a:rPr lang="en-US" altLang="ja-JP" dirty="0" smtClean="0"/>
+              <a:t>[https://</a:t>
+            </a:r>
+            <a:r>
+              <a:rPr lang="en-US" altLang="ja-JP" dirty="0" err="1" smtClean="0"/>
+              <a:t>espressif.com</a:t>
+            </a:r>
+            <a:r>
+              <a:rPr lang="en-US" altLang="ja-JP" dirty="0" smtClean="0"/>
+              <a:t>/</a:t>
+            </a:r>
+            <a:r>
+              <a:rPr lang="en-US" altLang="ja-JP" dirty="0" err="1" smtClean="0"/>
+              <a:t>en</a:t>
+            </a:r>
+            <a:r>
+              <a:rPr lang="en-US" altLang="ja-JP" dirty="0" smtClean="0"/>
+              <a:t>/products/hardware/esp32-devkitc/overview]</a:t>
+            </a:r>
+          </a:p>
+          <a:p>
+            <a:endParaRPr kumimoji="1" lang="en-US" altLang="ja-JP" dirty="0" smtClean="0"/>
+          </a:p>
+          <a:p>
+            <a:endParaRPr kumimoji="1" lang="en-US" altLang="ja-JP" dirty="0" smtClean="0"/>
+          </a:p>
+          <a:p>
+            <a:r>
+              <a:rPr kumimoji="1" lang="en-US" altLang="ja-JP" dirty="0" smtClean="0"/>
+              <a:t>ESP32</a:t>
+            </a:r>
+          </a:p>
+          <a:p>
+            <a:r>
+              <a:rPr kumimoji="1" lang="ja-JP" altLang="en-US" dirty="0" smtClean="0"/>
+              <a:t>消費電力が小さい</a:t>
+            </a:r>
             <a:endParaRPr kumimoji="1" lang="ja-JP" altLang="en-US" dirty="0"/>
           </a:p>
         </p:txBody>
@@ -953,7 +1043,263 @@
           <a:p>
             <a:fld id="{67A2FAF2-399E-7647-B872-8A96BB62A2B7}" type="slidenum">
               <a:rPr kumimoji="1" lang="ja-JP" altLang="en-US" smtClean="0"/>
-              <a:t>4</a:t>
+              <a:t>2</a:t>
+            </a:fld>
+            <a:endParaRPr kumimoji="1" lang="ja-JP" altLang="en-US"/>
+          </a:p>
+        </p:txBody>
+      </p:sp>
+    </p:spTree>
+    <p:extLst>
+      <p:ext uri="{BB962C8B-B14F-4D97-AF65-F5344CB8AC3E}">
+        <p14:creationId xmlns:p14="http://schemas.microsoft.com/office/powerpoint/2010/main" val="1894712942"/>
+      </p:ext>
+    </p:extLst>
+  </p:cSld>
+  <p:clrMapOvr>
+    <a:masterClrMapping/>
+  </p:clrMapOvr>
+</p:notes>
+</file>
+
+<file path=ppt/notesSlides/notesSlide4.xml><?xml version="1.0" encoding="utf-8"?>
+<p:notes xmlns:a="http://schemas.openxmlformats.org/drawingml/2006/main" xmlns:r="http://schemas.openxmlformats.org/officeDocument/2006/relationships" xmlns:p="http://schemas.openxmlformats.org/presentationml/2006/main">
+  <p:cSld>
+    <p:spTree>
+      <p:nvGrpSpPr>
+        <p:cNvPr id="1" name=""/>
+        <p:cNvGrpSpPr/>
+        <p:nvPr/>
+      </p:nvGrpSpPr>
+      <p:grpSpPr>
+        <a:xfrm>
+          <a:off x="0" y="0"/>
+          <a:ext cx="0" cy="0"/>
+          <a:chOff x="0" y="0"/>
+          <a:chExt cx="0" cy="0"/>
+        </a:xfrm>
+      </p:grpSpPr>
+      <p:sp>
+        <p:nvSpPr>
+          <p:cNvPr id="2" name="スライド イメージ プレースホルダー 1"/>
+          <p:cNvSpPr>
+            <a:spLocks noGrp="1" noRot="1" noChangeAspect="1"/>
+          </p:cNvSpPr>
+          <p:nvPr>
+            <p:ph type="sldImg"/>
+          </p:nvPr>
+        </p:nvSpPr>
+        <p:spPr/>
+      </p:sp>
+      <p:sp>
+        <p:nvSpPr>
+          <p:cNvPr id="3" name="ノート プレースホルダー 2"/>
+          <p:cNvSpPr>
+            <a:spLocks noGrp="1"/>
+          </p:cNvSpPr>
+          <p:nvPr>
+            <p:ph type="body" idx="1"/>
+          </p:nvPr>
+        </p:nvSpPr>
+        <p:spPr/>
+        <p:txBody>
+          <a:bodyPr/>
+          <a:lstStyle/>
+          <a:p>
+            <a:r>
+              <a:rPr kumimoji="1" lang="ja-JP" altLang="en-US" dirty="0" smtClean="0"/>
+              <a:t>大変だった点は個人作業だったこと</a:t>
+            </a:r>
+            <a:endParaRPr kumimoji="1" lang="ja-JP" altLang="en-US" dirty="0"/>
+          </a:p>
+        </p:txBody>
+      </p:sp>
+      <p:sp>
+        <p:nvSpPr>
+          <p:cNvPr id="4" name="スライド番号プレースホルダー 3"/>
+          <p:cNvSpPr>
+            <a:spLocks noGrp="1"/>
+          </p:cNvSpPr>
+          <p:nvPr>
+            <p:ph type="sldNum" sz="quarter" idx="10"/>
+          </p:nvPr>
+        </p:nvSpPr>
+        <p:spPr/>
+        <p:txBody>
+          <a:bodyPr/>
+          <a:lstStyle/>
+          <a:p>
+            <a:fld id="{67A2FAF2-399E-7647-B872-8A96BB62A2B7}" type="slidenum">
+              <a:rPr kumimoji="1" lang="ja-JP" altLang="en-US" smtClean="0"/>
+              <a:t>5</a:t>
+            </a:fld>
+            <a:endParaRPr kumimoji="1" lang="ja-JP" altLang="en-US"/>
+          </a:p>
+        </p:txBody>
+      </p:sp>
+    </p:spTree>
+    <p:extLst>
+      <p:ext uri="{BB962C8B-B14F-4D97-AF65-F5344CB8AC3E}">
+        <p14:creationId xmlns:p14="http://schemas.microsoft.com/office/powerpoint/2010/main" val="185755899"/>
+      </p:ext>
+    </p:extLst>
+  </p:cSld>
+  <p:clrMapOvr>
+    <a:masterClrMapping/>
+  </p:clrMapOvr>
+</p:notes>
+</file>
+
+<file path=ppt/notesSlides/notesSlide5.xml><?xml version="1.0" encoding="utf-8"?>
+<p:notes xmlns:a="http://schemas.openxmlformats.org/drawingml/2006/main" xmlns:r="http://schemas.openxmlformats.org/officeDocument/2006/relationships" xmlns:p="http://schemas.openxmlformats.org/presentationml/2006/main">
+  <p:cSld>
+    <p:spTree>
+      <p:nvGrpSpPr>
+        <p:cNvPr id="1" name=""/>
+        <p:cNvGrpSpPr/>
+        <p:nvPr/>
+      </p:nvGrpSpPr>
+      <p:grpSpPr>
+        <a:xfrm>
+          <a:off x="0" y="0"/>
+          <a:ext cx="0" cy="0"/>
+          <a:chOff x="0" y="0"/>
+          <a:chExt cx="0" cy="0"/>
+        </a:xfrm>
+      </p:grpSpPr>
+      <p:sp>
+        <p:nvSpPr>
+          <p:cNvPr id="2" name="スライド イメージ プレースホルダー 1"/>
+          <p:cNvSpPr>
+            <a:spLocks noGrp="1" noRot="1" noChangeAspect="1"/>
+          </p:cNvSpPr>
+          <p:nvPr>
+            <p:ph type="sldImg"/>
+          </p:nvPr>
+        </p:nvSpPr>
+        <p:spPr/>
+      </p:sp>
+      <p:sp>
+        <p:nvSpPr>
+          <p:cNvPr id="3" name="ノート プレースホルダー 2"/>
+          <p:cNvSpPr>
+            <a:spLocks noGrp="1"/>
+          </p:cNvSpPr>
+          <p:nvPr>
+            <p:ph type="body" idx="1"/>
+          </p:nvPr>
+        </p:nvSpPr>
+        <p:spPr/>
+        <p:txBody>
+          <a:bodyPr/>
+          <a:lstStyle/>
+          <a:p>
+            <a:endParaRPr kumimoji="1" lang="ja-JP" altLang="en-US" dirty="0"/>
+          </a:p>
+        </p:txBody>
+      </p:sp>
+      <p:sp>
+        <p:nvSpPr>
+          <p:cNvPr id="4" name="スライド番号プレースホルダー 3"/>
+          <p:cNvSpPr>
+            <a:spLocks noGrp="1"/>
+          </p:cNvSpPr>
+          <p:nvPr>
+            <p:ph type="sldNum" sz="quarter" idx="10"/>
+          </p:nvPr>
+        </p:nvSpPr>
+        <p:spPr/>
+        <p:txBody>
+          <a:bodyPr/>
+          <a:lstStyle/>
+          <a:p>
+            <a:fld id="{67A2FAF2-399E-7647-B872-8A96BB62A2B7}" type="slidenum">
+              <a:rPr kumimoji="1" lang="ja-JP" altLang="en-US" smtClean="0"/>
+              <a:t>7</a:t>
+            </a:fld>
+            <a:endParaRPr kumimoji="1" lang="ja-JP" altLang="en-US"/>
+          </a:p>
+        </p:txBody>
+      </p:sp>
+    </p:spTree>
+    <p:extLst>
+      <p:ext uri="{BB962C8B-B14F-4D97-AF65-F5344CB8AC3E}">
+        <p14:creationId xmlns:p14="http://schemas.microsoft.com/office/powerpoint/2010/main" val="6566451"/>
+      </p:ext>
+    </p:extLst>
+  </p:cSld>
+  <p:clrMapOvr>
+    <a:masterClrMapping/>
+  </p:clrMapOvr>
+</p:notes>
+</file>
+
+<file path=ppt/notesSlides/notesSlide6.xml><?xml version="1.0" encoding="utf-8"?>
+<p:notes xmlns:a="http://schemas.openxmlformats.org/drawingml/2006/main" xmlns:r="http://schemas.openxmlformats.org/officeDocument/2006/relationships" xmlns:p="http://schemas.openxmlformats.org/presentationml/2006/main">
+  <p:cSld>
+    <p:spTree>
+      <p:nvGrpSpPr>
+        <p:cNvPr id="1" name=""/>
+        <p:cNvGrpSpPr/>
+        <p:nvPr/>
+      </p:nvGrpSpPr>
+      <p:grpSpPr>
+        <a:xfrm>
+          <a:off x="0" y="0"/>
+          <a:ext cx="0" cy="0"/>
+          <a:chOff x="0" y="0"/>
+          <a:chExt cx="0" cy="0"/>
+        </a:xfrm>
+      </p:grpSpPr>
+      <p:sp>
+        <p:nvSpPr>
+          <p:cNvPr id="2" name="スライド イメージ プレースホルダー 1"/>
+          <p:cNvSpPr>
+            <a:spLocks noGrp="1" noRot="1" noChangeAspect="1"/>
+          </p:cNvSpPr>
+          <p:nvPr>
+            <p:ph type="sldImg"/>
+          </p:nvPr>
+        </p:nvSpPr>
+        <p:spPr/>
+      </p:sp>
+      <p:sp>
+        <p:nvSpPr>
+          <p:cNvPr id="3" name="ノート プレースホルダー 2"/>
+          <p:cNvSpPr>
+            <a:spLocks noGrp="1"/>
+          </p:cNvSpPr>
+          <p:nvPr>
+            <p:ph type="body" idx="1"/>
+          </p:nvPr>
+        </p:nvSpPr>
+        <p:spPr/>
+        <p:txBody>
+          <a:bodyPr/>
+          <a:lstStyle/>
+          <a:p>
+            <a:endParaRPr kumimoji="1" lang="ja-JP" altLang="en-US" dirty="0"/>
+          </a:p>
+        </p:txBody>
+      </p:sp>
+      <p:sp>
+        <p:nvSpPr>
+          <p:cNvPr id="4" name="スライド番号プレースホルダー 3"/>
+          <p:cNvSpPr>
+            <a:spLocks noGrp="1"/>
+          </p:cNvSpPr>
+          <p:nvPr>
+            <p:ph type="sldNum" sz="quarter" idx="10"/>
+          </p:nvPr>
+        </p:nvSpPr>
+        <p:spPr/>
+        <p:txBody>
+          <a:bodyPr/>
+          <a:lstStyle/>
+          <a:p>
+            <a:fld id="{67A2FAF2-399E-7647-B872-8A96BB62A2B7}" type="slidenum">
+              <a:rPr kumimoji="1" lang="ja-JP" altLang="en-US" smtClean="0"/>
+              <a:t>8</a:t>
             </a:fld>
             <a:endParaRPr kumimoji="1" lang="ja-JP" altLang="en-US"/>
           </a:p>
@@ -5388,10 +5734,6 @@
               <a:buNone/>
             </a:pPr>
             <a:r>
-              <a:rPr lang="en-US" altLang="ja-JP" dirty="0" err="1" smtClean="0"/>
-              <a:t>IoT</a:t>
-            </a:r>
-            <a:r>
               <a:rPr lang="en-US" altLang="ja-JP" dirty="0" smtClean="0"/>
               <a:t/>
             </a:r>
@@ -5423,6 +5765,61 @@
               <a:t>1</a:t>
             </a:fld>
             <a:endParaRPr lang="ja-JP" altLang="en-US" dirty="0"/>
+          </a:p>
+        </p:txBody>
+      </p:sp>
+      <p:sp>
+        <p:nvSpPr>
+          <p:cNvPr id="5" name="正方形/長方形 4"/>
+          <p:cNvSpPr/>
+          <p:nvPr/>
+        </p:nvSpPr>
+        <p:spPr>
+          <a:xfrm>
+            <a:off x="2843808" y="4797152"/>
+            <a:ext cx="3507840" cy="1323439"/>
+          </a:xfrm>
+          <a:prstGeom prst="rect">
+            <a:avLst/>
+          </a:prstGeom>
+          <a:noFill/>
+        </p:spPr>
+        <p:txBody>
+          <a:bodyPr wrap="square" lIns="91440" tIns="45720" rIns="91440" bIns="45720">
+            <a:spAutoFit/>
+          </a:bodyPr>
+          <a:lstStyle/>
+          <a:p>
+            <a:pPr algn="ctr"/>
+            <a:r>
+              <a:rPr lang="en-US" altLang="ja-JP" sz="8000" dirty="0" smtClean="0">
+                <a:ln w="0"/>
+                <a:solidFill>
+                  <a:srgbClr val="FF0000"/>
+                </a:solidFill>
+                <a:effectLst>
+                  <a:outerShdw blurRad="38100" dist="19050" dir="2700000" algn="tl" rotWithShape="0">
+                    <a:schemeClr val="dk1">
+                      <a:alpha val="40000"/>
+                    </a:schemeClr>
+                  </a:outerShdw>
+                </a:effectLst>
+              </a:rPr>
+              <a:t>IoT</a:t>
+            </a:r>
+            <a:endParaRPr lang="ja-JP" altLang="en-US" sz="8000" b="0" cap="none" spc="0" dirty="0">
+              <a:ln w="0"/>
+              <a:solidFill>
+                <a:srgbClr val="FF0000"/>
+              </a:solidFill>
+              <a:effectLst>
+                <a:outerShdw blurRad="38100" dist="19050" dir="2700000" algn="tl" rotWithShape="0">
+                  <a:schemeClr val="dk1">
+                    <a:alpha val="40000"/>
+                  </a:schemeClr>
+                </a:outerShdw>
+              </a:effectLst>
+            </a:endParaRPr>
           </a:p>
         </p:txBody>
       </p:sp>
@@ -5497,7 +5894,7 @@
         </p:spPr>
         <p:txBody>
           <a:bodyPr>
-            <a:normAutofit fontScale="85000" lnSpcReduction="20000"/>
+            <a:normAutofit/>
           </a:bodyPr>
           <a:lstStyle/>
           <a:p>
@@ -5509,7 +5906,7 @@
               <a:t>目的：</a:t>
             </a:r>
             <a:r>
-              <a:rPr kumimoji="1" lang="en-US" altLang="ja-JP" dirty="0" err="1" smtClean="0"/>
+              <a:rPr kumimoji="1" lang="en-US" altLang="ja-JP" dirty="0" smtClean="0"/>
               <a:t>IoT</a:t>
             </a:r>
             <a:r>
@@ -5582,54 +5979,35 @@
               <a:buNone/>
             </a:pPr>
             <a:r>
+              <a:rPr lang="ja-JP" altLang="en-US" dirty="0" smtClean="0"/>
+              <a:t>オープンソース</a:t>
+            </a:r>
+            <a:r>
               <a:rPr lang="en-US" altLang="ja-JP" dirty="0" smtClean="0"/>
-              <a:t>Microsoft</a:t>
-            </a:r>
-            <a:r>
-              <a:rPr lang="en-US" altLang="ja-JP" dirty="0"/>
-              <a:t> </a:t>
-            </a:r>
-            <a:r>
-              <a:rPr lang="en-US" altLang="ja-JP" b="1" dirty="0" err="1"/>
-              <a:t>MakeCode</a:t>
-            </a:r>
-            <a:r>
-              <a:rPr lang="en-US" altLang="ja-JP" dirty="0"/>
-              <a:t> is a free, open-source </a:t>
+              <a:t>(PXT : Programing Experience Toolkit)</a:t>
+            </a:r>
+          </a:p>
+          <a:p>
+            <a:pPr marL="201168" lvl="1" indent="0">
+              <a:buNone/>
+            </a:pPr>
+            <a:r>
+              <a:rPr lang="en-US" altLang="ja-JP" dirty="0" err="1" smtClean="0"/>
+              <a:t>Blockly</a:t>
+            </a:r>
+            <a:r>
+              <a:rPr lang="ja-JP" altLang="en-US" dirty="0" smtClean="0"/>
+              <a:t>ベースのビジュアル言語と</a:t>
             </a:r>
             <a:r>
               <a:rPr lang="en-US" altLang="ja-JP" dirty="0" smtClean="0"/>
-              <a:t>Block </a:t>
-            </a:r>
-            <a:r>
-              <a:rPr lang="en-US" altLang="ja-JP" dirty="0"/>
-              <a:t>and JavaScript learn-to-code editor that promotes a more inclusive approach to computing education</a:t>
-            </a:r>
-            <a:r>
-              <a:rPr lang="en-US" altLang="ja-JP" dirty="0" smtClean="0"/>
-              <a:t>.</a:t>
-            </a:r>
-          </a:p>
-          <a:p>
-            <a:pPr marL="201168" lvl="1" indent="0">
-              <a:buNone/>
-            </a:pPr>
-            <a:r>
-              <a:rPr lang="en-US" altLang="ja-JP" dirty="0" smtClean="0"/>
-              <a:t>[https</a:t>
-            </a:r>
-            <a:r>
-              <a:rPr lang="en-US" altLang="ja-JP" dirty="0"/>
-              <a:t>://</a:t>
-            </a:r>
-            <a:r>
-              <a:rPr lang="en-US" altLang="ja-JP" dirty="0" err="1" smtClean="0"/>
-              <a:t>makecode.com</a:t>
-            </a:r>
-            <a:r>
-              <a:rPr lang="en-US" altLang="ja-JP" dirty="0" smtClean="0"/>
-              <a:t>]</a:t>
-            </a:r>
+              <a:t>JavaScript</a:t>
+            </a:r>
+            <a:r>
+              <a:rPr lang="ja-JP" altLang="en-US" dirty="0" smtClean="0"/>
+              <a:t>に対応したエディタ</a:t>
+            </a:r>
+            <a:endParaRPr lang="en-US" altLang="ja-JP" dirty="0" smtClean="0"/>
           </a:p>
           <a:p>
             <a:pPr lvl="1">
@@ -5651,54 +6029,29 @@
               <a:buNone/>
             </a:pPr>
             <a:r>
-              <a:rPr lang="en-US" altLang="ja-JP" dirty="0"/>
-              <a:t>Built around the ESP-WROOM-32, this minimal system development board achieves optimal performance with its rich peripheral set, Wi-Fi and Bluetooth radio solutions offered by our latest </a:t>
-            </a:r>
-            <a:r>
-              <a:rPr lang="en-US" altLang="ja-JP" dirty="0" err="1"/>
-              <a:t>SoC</a:t>
-            </a:r>
-            <a:r>
-              <a:rPr lang="en-US" altLang="ja-JP" dirty="0"/>
-              <a:t>, the ESP32</a:t>
+              <a:rPr lang="en-US" altLang="ja-JP" dirty="0" err="1" smtClean="0"/>
+              <a:t>WiFi</a:t>
+            </a:r>
+            <a:r>
+              <a:rPr lang="ja-JP" altLang="en-US" dirty="0" smtClean="0"/>
+              <a:t>と</a:t>
             </a:r>
             <a:r>
               <a:rPr lang="en-US" altLang="ja-JP" dirty="0" smtClean="0"/>
-              <a:t>.</a:t>
-            </a:r>
-          </a:p>
-          <a:p>
-            <a:pPr marL="201168" lvl="1" indent="0">
+              <a:t>Bluetooth</a:t>
+            </a:r>
+            <a:r>
+              <a:rPr lang="ja-JP" altLang="en-US" dirty="0" smtClean="0"/>
+              <a:t>を内蔵するマイコン</a:t>
+            </a:r>
+            <a:endParaRPr kumimoji="1" lang="en-US" altLang="ja-JP" dirty="0" smtClean="0"/>
+          </a:p>
+          <a:p>
+            <a:pPr marL="0" indent="0">
               <a:buNone/>
             </a:pPr>
             <a:r>
-              <a:rPr lang="en-US" altLang="ja-JP" dirty="0"/>
-              <a:t>[https://</a:t>
-            </a:r>
-            <a:r>
-              <a:rPr lang="en-US" altLang="ja-JP" dirty="0" err="1"/>
-              <a:t>espressif.com</a:t>
-            </a:r>
-            <a:r>
-              <a:rPr lang="en-US" altLang="ja-JP" dirty="0"/>
-              <a:t>/</a:t>
-            </a:r>
-            <a:r>
-              <a:rPr lang="en-US" altLang="ja-JP" dirty="0" err="1"/>
-              <a:t>en</a:t>
-            </a:r>
-            <a:r>
-              <a:rPr lang="en-US" altLang="ja-JP" dirty="0"/>
-              <a:t>/products/hardware/esp32-devkitc/overview]</a:t>
-            </a:r>
-            <a:endParaRPr lang="en-US" altLang="ja-JP" dirty="0" smtClean="0"/>
-          </a:p>
-          <a:p>
-            <a:pPr marL="0" indent="0">
-              <a:buNone/>
-            </a:pPr>
-            <a:r>
-              <a:rPr lang="ja-JP" altLang="en-US" dirty="0"/>
+              <a:rPr lang="ja-JP" altLang="en-US" dirty="0" smtClean="0"/>
               <a:t>結論</a:t>
             </a:r>
             <a:endParaRPr lang="en-US" altLang="ja-JP" dirty="0"/>
@@ -5805,132 +6158,10 @@
           <a:lstStyle/>
           <a:p>
             <a:r>
-              <a:rPr kumimoji="1" lang="ja-JP" altLang="en-US" dirty="0" smtClean="0"/>
-              <a:t>内容：後半</a:t>
-            </a:r>
-            <a:endParaRPr kumimoji="1" lang="ja-JP" altLang="en-US" dirty="0"/>
-          </a:p>
-        </p:txBody>
-      </p:sp>
-      <p:sp>
-        <p:nvSpPr>
-          <p:cNvPr id="3" name="コンテンツ プレースホルダー 2"/>
-          <p:cNvSpPr>
-            <a:spLocks noGrp="1"/>
-          </p:cNvSpPr>
-          <p:nvPr>
-            <p:ph idx="1"/>
-          </p:nvPr>
-        </p:nvSpPr>
-        <p:spPr/>
-        <p:txBody>
-          <a:bodyPr/>
-          <a:lstStyle/>
-          <a:p>
-            <a:pPr>
-              <a:buFont typeface="Wingdings" charset="2"/>
-              <a:buChar char="l"/>
-            </a:pPr>
-            <a:r>
-              <a:rPr kumimoji="1" lang="en-US" altLang="ja-JP" dirty="0" smtClean="0"/>
-              <a:t> </a:t>
-            </a:r>
-            <a:r>
-              <a:rPr kumimoji="1" lang="en-US" altLang="ja-JP" dirty="0" err="1" smtClean="0"/>
-              <a:t>Espruino</a:t>
-            </a:r>
-            <a:r>
-              <a:rPr lang="ja-JP" altLang="en-US" dirty="0" smtClean="0"/>
-              <a:t>の調査</a:t>
-            </a:r>
-            <a:endParaRPr lang="en-US" altLang="ja-JP" dirty="0" smtClean="0"/>
-          </a:p>
-          <a:p>
-            <a:pPr marL="0" indent="0">
-              <a:buNone/>
-            </a:pPr>
-            <a:r>
-              <a:rPr lang="ja-JP" altLang="en-US" dirty="0" smtClean="0"/>
-              <a:t>開発環境の構築に少々手間取ったが</a:t>
-            </a:r>
-            <a:r>
-              <a:rPr lang="en-US" altLang="ja-JP" dirty="0" smtClean="0"/>
-              <a:t>ESP32</a:t>
-            </a:r>
-            <a:r>
-              <a:rPr lang="ja-JP" altLang="en-US" dirty="0" smtClean="0"/>
-              <a:t>へプログラムの書き込みを行った．</a:t>
-            </a:r>
-            <a:endParaRPr lang="en-US" altLang="ja-JP" dirty="0" smtClean="0"/>
-          </a:p>
-          <a:p>
-            <a:pPr marL="0" indent="0">
-              <a:buNone/>
-            </a:pPr>
-            <a:r>
-              <a:rPr lang="ja-JP" altLang="en-US" dirty="0" smtClean="0"/>
-              <a:t>しかし，</a:t>
-            </a:r>
-            <a:r>
-              <a:rPr lang="en-US" altLang="ja-JP" dirty="0" err="1" smtClean="0"/>
+              <a:rPr kumimoji="1" lang="en-US" altLang="ja-JP" b="1" dirty="0" err="1" smtClean="0"/>
               <a:t>MakeCode</a:t>
             </a:r>
-            <a:r>
-              <a:rPr lang="ja-JP" altLang="en-US" dirty="0" smtClean="0"/>
-              <a:t>に対しシミュレータの不足などが課題</a:t>
-            </a:r>
-            <a:endParaRPr lang="en-US" altLang="ja-JP" dirty="0" smtClean="0"/>
-          </a:p>
-          <a:p>
-            <a:pPr>
-              <a:buFont typeface="Wingdings" charset="2"/>
-              <a:buChar char="l"/>
-            </a:pPr>
-            <a:r>
-              <a:rPr kumimoji="1" lang="en-US" altLang="ja-JP" dirty="0"/>
-              <a:t> </a:t>
-            </a:r>
-            <a:r>
-              <a:rPr kumimoji="1" lang="en-US" altLang="ja-JP" dirty="0" err="1" smtClean="0"/>
-              <a:t>Micro;bit</a:t>
-            </a:r>
-            <a:r>
-              <a:rPr lang="ja-JP" altLang="en-US" dirty="0" smtClean="0"/>
-              <a:t>で有機</a:t>
-            </a:r>
-            <a:r>
-              <a:rPr lang="en-US" altLang="ja-JP" dirty="0" smtClean="0"/>
-              <a:t>EL</a:t>
-            </a:r>
-            <a:r>
-              <a:rPr lang="ja-JP" altLang="en-US" dirty="0" smtClean="0"/>
-              <a:t>ディスプレイを使用</a:t>
-            </a:r>
-            <a:endParaRPr lang="en-US" altLang="ja-JP" dirty="0" smtClean="0"/>
-          </a:p>
-          <a:p>
-            <a:pPr marL="0" indent="0">
-              <a:buNone/>
-            </a:pPr>
-            <a:r>
-              <a:rPr kumimoji="1" lang="ja-JP" altLang="en-US" dirty="0" smtClean="0"/>
-              <a:t>ディスプレイ用のライブラリを</a:t>
-            </a:r>
-            <a:r>
-              <a:rPr kumimoji="1" lang="en-US" altLang="ja-JP" dirty="0" err="1" smtClean="0"/>
-              <a:t>MakeCode</a:t>
-            </a:r>
-            <a:r>
-              <a:rPr kumimoji="1" lang="ja-JP" altLang="en-US" dirty="0" smtClean="0"/>
-              <a:t>内で使用できるようにし，各種表示機能をブロックで表示した．</a:t>
-            </a:r>
-            <a:endParaRPr kumimoji="1" lang="en-US" altLang="ja-JP" dirty="0" smtClean="0"/>
-          </a:p>
-          <a:p>
-            <a:pPr marL="0" indent="0">
-              <a:buNone/>
-            </a:pPr>
-            <a:endParaRPr kumimoji="1" lang="ja-JP" altLang="en-US" dirty="0"/>
+            <a:endParaRPr kumimoji="1" lang="ja-JP" altLang="en-US" b="1" dirty="0"/>
           </a:p>
         </p:txBody>
       </p:sp>
@@ -5958,10 +6189,40 @@
           </a:p>
         </p:txBody>
       </p:sp>
+      <p:pic>
+        <p:nvPicPr>
+          <p:cNvPr id="5" name="図 4"/>
+          <p:cNvPicPr>
+            <a:picLocks noChangeAspect="1"/>
+          </p:cNvPicPr>
+          <p:nvPr/>
+        </p:nvPicPr>
+        <p:blipFill>
+          <a:blip r:embed="rId2">
+            <a:extLst>
+              <a:ext uri="{28A0092B-C50C-407E-A947-70E740481C1C}">
+                <a14:useLocalDpi xmlns:a14="http://schemas.microsoft.com/office/drawing/2010/main" val="0"/>
+              </a:ext>
+            </a:extLst>
+          </a:blip>
+          <a:stretch>
+            <a:fillRect/>
+          </a:stretch>
+        </p:blipFill>
+        <p:spPr>
+          <a:xfrm>
+            <a:off x="395536" y="1124744"/>
+            <a:ext cx="8388424" cy="5039315"/>
+          </a:xfrm>
+          <a:prstGeom prst="rect">
+            <a:avLst/>
+          </a:prstGeom>
+        </p:spPr>
+      </p:pic>
     </p:spTree>
     <p:extLst>
       <p:ext uri="{BB962C8B-B14F-4D97-AF65-F5344CB8AC3E}">
-        <p14:creationId xmlns:p14="http://schemas.microsoft.com/office/powerpoint/2010/main" val="2053591999"/>
+        <p14:creationId xmlns:p14="http://schemas.microsoft.com/office/powerpoint/2010/main" val="1220940569"/>
       </p:ext>
     </p:extLst>
   </p:cSld>
@@ -6000,6 +6261,664 @@
         </p:nvSpPr>
         <p:spPr/>
         <p:txBody>
+          <a:bodyPr>
+            <a:normAutofit fontScale="90000"/>
+          </a:bodyPr>
+          <a:lstStyle/>
+          <a:p>
+            <a:r>
+              <a:rPr lang="en-US" altLang="ja-JP" b="1" dirty="0"/>
+              <a:t>ESP32-DevKitC(ESP-WROOM32</a:t>
+            </a:r>
+            <a:r>
+              <a:rPr lang="ja-JP" altLang="en-US" b="1" dirty="0"/>
+              <a:t>開発ボード</a:t>
+            </a:r>
+            <a:r>
+              <a:rPr lang="en-US" altLang="ja-JP" b="1" dirty="0"/>
+              <a:t>)</a:t>
+            </a:r>
+            <a:endParaRPr kumimoji="1" lang="ja-JP" altLang="en-US" b="1" dirty="0"/>
+          </a:p>
+        </p:txBody>
+      </p:sp>
+      <p:sp>
+        <p:nvSpPr>
+          <p:cNvPr id="4" name="スライド番号プレースホルダー 3"/>
+          <p:cNvSpPr>
+            <a:spLocks noGrp="1"/>
+          </p:cNvSpPr>
+          <p:nvPr>
+            <p:ph type="sldNum" sz="quarter" idx="12"/>
+          </p:nvPr>
+        </p:nvSpPr>
+        <p:spPr/>
+        <p:txBody>
+          <a:bodyPr/>
+          <a:lstStyle/>
+          <a:p>
+            <a:fld id="{874224F4-E8E7-214B-AE1E-E0AB1FB5763D}" type="slidenum">
+              <a:rPr lang="ja-JP" altLang="en-US" smtClean="0"/>
+              <a:pPr/>
+              <a:t>4</a:t>
+            </a:fld>
+            <a:endParaRPr lang="ja-JP" altLang="en-US" dirty="0"/>
+          </a:p>
+        </p:txBody>
+      </p:sp>
+      <p:pic>
+        <p:nvPicPr>
+          <p:cNvPr id="5" name="図 4"/>
+          <p:cNvPicPr>
+            <a:picLocks noChangeAspect="1"/>
+          </p:cNvPicPr>
+          <p:nvPr/>
+        </p:nvPicPr>
+        <p:blipFill>
+          <a:blip r:embed="rId2">
+            <a:extLst>
+              <a:ext uri="{28A0092B-C50C-407E-A947-70E740481C1C}">
+                <a14:useLocalDpi xmlns:a14="http://schemas.microsoft.com/office/drawing/2010/main" val="0"/>
+              </a:ext>
+            </a:extLst>
+          </a:blip>
+          <a:stretch>
+            <a:fillRect/>
+          </a:stretch>
+        </p:blipFill>
+        <p:spPr>
+          <a:xfrm>
+            <a:off x="2125372" y="1271270"/>
+            <a:ext cx="4941168" cy="4941168"/>
+          </a:xfrm>
+          <a:prstGeom prst="rect">
+            <a:avLst/>
+          </a:prstGeom>
+        </p:spPr>
+      </p:pic>
+    </p:spTree>
+    <p:extLst>
+      <p:ext uri="{BB962C8B-B14F-4D97-AF65-F5344CB8AC3E}">
+        <p14:creationId xmlns:p14="http://schemas.microsoft.com/office/powerpoint/2010/main" val="1141896098"/>
+      </p:ext>
+    </p:extLst>
+  </p:cSld>
+  <p:clrMapOvr>
+    <a:masterClrMapping/>
+  </p:clrMapOvr>
+</p:sld>
+</file>
+
+<file path=ppt/slides/slide6.xml><?xml version="1.0" encoding="utf-8"?>
+<p:sld xmlns:a="http://schemas.openxmlformats.org/drawingml/2006/main" xmlns:r="http://schemas.openxmlformats.org/officeDocument/2006/relationships" xmlns:p="http://schemas.openxmlformats.org/presentationml/2006/main">
+  <p:cSld>
+    <p:spTree>
+      <p:nvGrpSpPr>
+        <p:cNvPr id="1" name=""/>
+        <p:cNvGrpSpPr/>
+        <p:nvPr/>
+      </p:nvGrpSpPr>
+      <p:grpSpPr>
+        <a:xfrm>
+          <a:off x="0" y="0"/>
+          <a:ext cx="0" cy="0"/>
+          <a:chOff x="0" y="0"/>
+          <a:chExt cx="0" cy="0"/>
+        </a:xfrm>
+      </p:grpSpPr>
+      <p:sp>
+        <p:nvSpPr>
+          <p:cNvPr id="2" name="タイトル 1"/>
+          <p:cNvSpPr>
+            <a:spLocks noGrp="1"/>
+          </p:cNvSpPr>
+          <p:nvPr>
+            <p:ph type="title"/>
+          </p:nvPr>
+        </p:nvSpPr>
+        <p:spPr/>
+        <p:txBody>
+          <a:bodyPr/>
+          <a:lstStyle/>
+          <a:p>
+            <a:r>
+              <a:rPr kumimoji="1" lang="ja-JP" altLang="en-US" dirty="0" smtClean="0"/>
+              <a:t>内容：後半</a:t>
+            </a:r>
+            <a:endParaRPr kumimoji="1" lang="ja-JP" altLang="en-US" dirty="0"/>
+          </a:p>
+        </p:txBody>
+      </p:sp>
+      <p:sp>
+        <p:nvSpPr>
+          <p:cNvPr id="3" name="コンテンツ プレースホルダー 2"/>
+          <p:cNvSpPr>
+            <a:spLocks noGrp="1"/>
+          </p:cNvSpPr>
+          <p:nvPr>
+            <p:ph idx="1"/>
+          </p:nvPr>
+        </p:nvSpPr>
+        <p:spPr/>
+        <p:txBody>
+          <a:bodyPr/>
+          <a:lstStyle/>
+          <a:p>
+            <a:pPr>
+              <a:buFont typeface="Wingdings" charset="2"/>
+              <a:buChar char="l"/>
+            </a:pPr>
+            <a:r>
+              <a:rPr kumimoji="1" lang="en-US" altLang="ja-JP" dirty="0" smtClean="0"/>
+              <a:t> </a:t>
+            </a:r>
+            <a:r>
+              <a:rPr kumimoji="1" lang="en-US" altLang="ja-JP" dirty="0" err="1" smtClean="0"/>
+              <a:t>Espruino</a:t>
+            </a:r>
+            <a:r>
+              <a:rPr lang="ja-JP" altLang="en-US" dirty="0" smtClean="0"/>
+              <a:t>の調査</a:t>
+            </a:r>
+            <a:endParaRPr lang="en-US" altLang="ja-JP" dirty="0" smtClean="0"/>
+          </a:p>
+          <a:p>
+            <a:pPr marL="0" indent="0">
+              <a:buNone/>
+            </a:pPr>
+            <a:r>
+              <a:rPr lang="ja-JP" altLang="en-US" dirty="0" smtClean="0"/>
+              <a:t>開発環境の構築に少々手間取ったが</a:t>
+            </a:r>
+            <a:r>
+              <a:rPr lang="en-US" altLang="ja-JP" dirty="0" smtClean="0"/>
+              <a:t>ESP32</a:t>
+            </a:r>
+            <a:r>
+              <a:rPr lang="ja-JP" altLang="en-US" dirty="0" smtClean="0"/>
+              <a:t>へプログラムの書き込みを行った．</a:t>
+            </a:r>
+            <a:endParaRPr lang="en-US" altLang="ja-JP" dirty="0" smtClean="0"/>
+          </a:p>
+          <a:p>
+            <a:pPr marL="0" indent="0">
+              <a:buNone/>
+            </a:pPr>
+            <a:r>
+              <a:rPr lang="ja-JP" altLang="en-US" dirty="0" smtClean="0"/>
+              <a:t>しかし，</a:t>
+            </a:r>
+            <a:r>
+              <a:rPr lang="en-US" altLang="ja-JP" dirty="0" err="1" smtClean="0"/>
+              <a:t>MakeCode</a:t>
+            </a:r>
+            <a:r>
+              <a:rPr lang="ja-JP" altLang="en-US" dirty="0" smtClean="0"/>
+              <a:t>に対しシミュレータの不足などが課題</a:t>
+            </a:r>
+            <a:endParaRPr lang="en-US" altLang="ja-JP" dirty="0" smtClean="0"/>
+          </a:p>
+          <a:p>
+            <a:pPr>
+              <a:buFont typeface="Wingdings" charset="2"/>
+              <a:buChar char="l"/>
+            </a:pPr>
+            <a:r>
+              <a:rPr kumimoji="1" lang="en-US" altLang="ja-JP" dirty="0"/>
+              <a:t> </a:t>
+            </a:r>
+            <a:r>
+              <a:rPr lang="en-US" altLang="ja-JP" dirty="0" err="1"/>
+              <a:t>m</a:t>
+            </a:r>
+            <a:r>
+              <a:rPr kumimoji="1" lang="en-US" altLang="ja-JP" dirty="0" err="1" smtClean="0"/>
+              <a:t>icro;bit</a:t>
+            </a:r>
+            <a:r>
+              <a:rPr lang="ja-JP" altLang="en-US" dirty="0" smtClean="0"/>
+              <a:t>で有機</a:t>
+            </a:r>
+            <a:r>
+              <a:rPr lang="en-US" altLang="ja-JP" dirty="0" smtClean="0"/>
+              <a:t>EL</a:t>
+            </a:r>
+            <a:r>
+              <a:rPr lang="ja-JP" altLang="en-US" dirty="0" smtClean="0"/>
+              <a:t>ディスプレイを使用</a:t>
+            </a:r>
+            <a:endParaRPr lang="en-US" altLang="ja-JP" dirty="0" smtClean="0"/>
+          </a:p>
+          <a:p>
+            <a:pPr marL="0" indent="0">
+              <a:buNone/>
+            </a:pPr>
+            <a:r>
+              <a:rPr kumimoji="1" lang="ja-JP" altLang="en-US" dirty="0" smtClean="0"/>
+              <a:t>ディスプレイ用のライブラリを</a:t>
+            </a:r>
+            <a:r>
+              <a:rPr kumimoji="1" lang="en-US" altLang="ja-JP" dirty="0" err="1" smtClean="0"/>
+              <a:t>MakeCode</a:t>
+            </a:r>
+            <a:r>
+              <a:rPr kumimoji="1" lang="ja-JP" altLang="en-US" dirty="0" smtClean="0"/>
+              <a:t>内で使用できるようにし，各種表示機能をブロックで表示した．</a:t>
+            </a:r>
+            <a:endParaRPr kumimoji="1" lang="en-US" altLang="ja-JP" dirty="0" smtClean="0"/>
+          </a:p>
+          <a:p>
+            <a:pPr marL="0" indent="0">
+              <a:buNone/>
+            </a:pPr>
+            <a:endParaRPr kumimoji="1" lang="ja-JP" altLang="en-US" dirty="0"/>
+          </a:p>
+        </p:txBody>
+      </p:sp>
+      <p:sp>
+        <p:nvSpPr>
+          <p:cNvPr id="4" name="スライド番号プレースホルダー 3"/>
+          <p:cNvSpPr>
+            <a:spLocks noGrp="1"/>
+          </p:cNvSpPr>
+          <p:nvPr>
+            <p:ph type="sldNum" sz="quarter" idx="12"/>
+          </p:nvPr>
+        </p:nvSpPr>
+        <p:spPr/>
+        <p:txBody>
+          <a:bodyPr/>
+          <a:lstStyle/>
+          <a:p>
+            <a:fld id="{874224F4-E8E7-214B-AE1E-E0AB1FB5763D}" type="slidenum">
+              <a:rPr lang="ja-JP" altLang="en-US" smtClean="0"/>
+              <a:pPr/>
+              <a:t>5</a:t>
+            </a:fld>
+            <a:endParaRPr lang="ja-JP" altLang="en-US" dirty="0"/>
+          </a:p>
+        </p:txBody>
+      </p:sp>
+      <p:sp>
+        <p:nvSpPr>
+          <p:cNvPr id="5" name="正方形/長方形 4"/>
+          <p:cNvSpPr/>
+          <p:nvPr/>
+        </p:nvSpPr>
+        <p:spPr>
+          <a:xfrm>
+            <a:off x="1852256" y="5077816"/>
+            <a:ext cx="5487400" cy="923330"/>
+          </a:xfrm>
+          <a:prstGeom prst="rect">
+            <a:avLst/>
+          </a:prstGeom>
+          <a:noFill/>
+        </p:spPr>
+        <p:txBody>
+          <a:bodyPr wrap="none" lIns="91440" tIns="45720" rIns="91440" bIns="45720">
+            <a:spAutoFit/>
+          </a:bodyPr>
+          <a:lstStyle/>
+          <a:p>
+            <a:pPr algn="ctr"/>
+            <a:r>
+              <a:rPr lang="ja-JP" altLang="en-US" sz="5400" smtClean="0">
+                <a:ln w="0"/>
+                <a:solidFill>
+                  <a:srgbClr val="FF0000"/>
+                </a:solidFill>
+                <a:effectLst>
+                  <a:outerShdw blurRad="38100" dist="19050" dir="2700000" algn="tl" rotWithShape="0">
+                    <a:schemeClr val="dk1">
+                      <a:alpha val="40000"/>
+                    </a:schemeClr>
+                  </a:outerShdw>
+                </a:effectLst>
+              </a:rPr>
+              <a:t>まさかの個人作業</a:t>
+            </a:r>
+            <a:endParaRPr lang="ja-JP" altLang="en-US" sz="5400" b="0" cap="none" spc="0" dirty="0">
+              <a:ln w="0"/>
+              <a:solidFill>
+                <a:srgbClr val="FF0000"/>
+              </a:solidFill>
+              <a:effectLst>
+                <a:outerShdw blurRad="38100" dist="19050" dir="2700000" algn="tl" rotWithShape="0">
+                  <a:schemeClr val="dk1">
+                    <a:alpha val="40000"/>
+                  </a:schemeClr>
+                </a:outerShdw>
+              </a:effectLst>
+            </a:endParaRPr>
+          </a:p>
+        </p:txBody>
+      </p:sp>
+    </p:spTree>
+    <p:extLst>
+      <p:ext uri="{BB962C8B-B14F-4D97-AF65-F5344CB8AC3E}">
+        <p14:creationId xmlns:p14="http://schemas.microsoft.com/office/powerpoint/2010/main" val="2053591999"/>
+      </p:ext>
+    </p:extLst>
+  </p:cSld>
+  <p:clrMapOvr>
+    <a:masterClrMapping/>
+  </p:clrMapOvr>
+  <p:timing>
+    <p:tnLst>
+      <p:par>
+        <p:cTn id="1" dur="indefinite" restart="never" nodeType="tmRoot"/>
+      </p:par>
+    </p:tnLst>
+  </p:timing>
+</p:sld>
+</file>
+
+<file path=ppt/slides/slide7.xml><?xml version="1.0" encoding="utf-8"?>
+<p:sld xmlns:a="http://schemas.openxmlformats.org/drawingml/2006/main" xmlns:r="http://schemas.openxmlformats.org/officeDocument/2006/relationships" xmlns:p="http://schemas.openxmlformats.org/presentationml/2006/main">
+  <p:cSld>
+    <p:spTree>
+      <p:nvGrpSpPr>
+        <p:cNvPr id="1" name=""/>
+        <p:cNvGrpSpPr/>
+        <p:nvPr/>
+      </p:nvGrpSpPr>
+      <p:grpSpPr>
+        <a:xfrm>
+          <a:off x="0" y="0"/>
+          <a:ext cx="0" cy="0"/>
+          <a:chOff x="0" y="0"/>
+          <a:chExt cx="0" cy="0"/>
+        </a:xfrm>
+      </p:grpSpPr>
+      <p:sp>
+        <p:nvSpPr>
+          <p:cNvPr id="2" name="タイトル 1"/>
+          <p:cNvSpPr>
+            <a:spLocks noGrp="1"/>
+          </p:cNvSpPr>
+          <p:nvPr>
+            <p:ph type="title"/>
+          </p:nvPr>
+        </p:nvSpPr>
+        <p:spPr/>
+        <p:txBody>
+          <a:bodyPr/>
+          <a:lstStyle/>
+          <a:p>
+            <a:r>
+              <a:rPr kumimoji="1" lang="en-US" altLang="ja-JP" b="1" dirty="0" err="1" smtClean="0"/>
+              <a:t>Espruino</a:t>
+            </a:r>
+            <a:endParaRPr kumimoji="1" lang="ja-JP" altLang="en-US" b="1" dirty="0"/>
+          </a:p>
+        </p:txBody>
+      </p:sp>
+      <p:sp>
+        <p:nvSpPr>
+          <p:cNvPr id="4" name="スライド番号プレースホルダー 3"/>
+          <p:cNvSpPr>
+            <a:spLocks noGrp="1"/>
+          </p:cNvSpPr>
+          <p:nvPr>
+            <p:ph type="sldNum" sz="quarter" idx="12"/>
+          </p:nvPr>
+        </p:nvSpPr>
+        <p:spPr/>
+        <p:txBody>
+          <a:bodyPr/>
+          <a:lstStyle/>
+          <a:p>
+            <a:fld id="{874224F4-E8E7-214B-AE1E-E0AB1FB5763D}" type="slidenum">
+              <a:rPr lang="ja-JP" altLang="en-US" smtClean="0"/>
+              <a:pPr/>
+              <a:t>6</a:t>
+            </a:fld>
+            <a:endParaRPr lang="ja-JP" altLang="en-US" dirty="0"/>
+          </a:p>
+        </p:txBody>
+      </p:sp>
+      <p:pic>
+        <p:nvPicPr>
+          <p:cNvPr id="5" name="図 4"/>
+          <p:cNvPicPr>
+            <a:picLocks noChangeAspect="1"/>
+          </p:cNvPicPr>
+          <p:nvPr/>
+        </p:nvPicPr>
+        <p:blipFill>
+          <a:blip r:embed="rId2">
+            <a:extLst>
+              <a:ext uri="{28A0092B-C50C-407E-A947-70E740481C1C}">
+                <a14:useLocalDpi xmlns:a14="http://schemas.microsoft.com/office/drawing/2010/main" val="0"/>
+              </a:ext>
+            </a:extLst>
+          </a:blip>
+          <a:stretch>
+            <a:fillRect/>
+          </a:stretch>
+        </p:blipFill>
+        <p:spPr>
+          <a:xfrm>
+            <a:off x="531956" y="1162199"/>
+            <a:ext cx="8128000" cy="5080000"/>
+          </a:xfrm>
+          <a:prstGeom prst="rect">
+            <a:avLst/>
+          </a:prstGeom>
+        </p:spPr>
+      </p:pic>
+    </p:spTree>
+    <p:extLst>
+      <p:ext uri="{BB962C8B-B14F-4D97-AF65-F5344CB8AC3E}">
+        <p14:creationId xmlns:p14="http://schemas.microsoft.com/office/powerpoint/2010/main" val="91356611"/>
+      </p:ext>
+    </p:extLst>
+  </p:cSld>
+  <p:clrMapOvr>
+    <a:masterClrMapping/>
+  </p:clrMapOvr>
+  <p:timing>
+    <p:tnLst>
+      <p:par>
+        <p:cTn id="1" dur="indefinite" restart="never" nodeType="tmRoot"/>
+      </p:par>
+    </p:tnLst>
+  </p:timing>
+</p:sld>
+</file>
+
+<file path=ppt/slides/slide8.xml><?xml version="1.0" encoding="utf-8"?>
+<p:sld xmlns:a="http://schemas.openxmlformats.org/drawingml/2006/main" xmlns:r="http://schemas.openxmlformats.org/officeDocument/2006/relationships" xmlns:p="http://schemas.openxmlformats.org/presentationml/2006/main">
+  <p:cSld>
+    <p:spTree>
+      <p:nvGrpSpPr>
+        <p:cNvPr id="1" name=""/>
+        <p:cNvGrpSpPr/>
+        <p:nvPr/>
+      </p:nvGrpSpPr>
+      <p:grpSpPr>
+        <a:xfrm>
+          <a:off x="0" y="0"/>
+          <a:ext cx="0" cy="0"/>
+          <a:chOff x="0" y="0"/>
+          <a:chExt cx="0" cy="0"/>
+        </a:xfrm>
+      </p:grpSpPr>
+      <p:sp>
+        <p:nvSpPr>
+          <p:cNvPr id="2" name="タイトル 1"/>
+          <p:cNvSpPr>
+            <a:spLocks noGrp="1"/>
+          </p:cNvSpPr>
+          <p:nvPr>
+            <p:ph type="title"/>
+          </p:nvPr>
+        </p:nvSpPr>
+        <p:spPr/>
+        <p:txBody>
+          <a:bodyPr/>
+          <a:lstStyle/>
+          <a:p>
+            <a:r>
+              <a:rPr lang="en-US" altLang="ja-JP" b="1" dirty="0" smtClean="0"/>
+              <a:t>m</a:t>
+            </a:r>
+            <a:r>
+              <a:rPr kumimoji="1" lang="en-US" altLang="ja-JP" b="1" dirty="0" smtClean="0"/>
+              <a:t>icro;bit</a:t>
+            </a:r>
+            <a:r>
+              <a:rPr kumimoji="1" lang="en-US" altLang="ja-JP" dirty="0" smtClean="0"/>
+              <a:t> &amp; </a:t>
+            </a:r>
+            <a:r>
+              <a:rPr kumimoji="1" lang="ja-JP" altLang="en-US" dirty="0" smtClean="0">
+                <a:latin typeface="+mn-lt"/>
+              </a:rPr>
+              <a:t>有機</a:t>
+            </a:r>
+            <a:r>
+              <a:rPr kumimoji="1" lang="en-US" altLang="ja-JP" b="1" dirty="0" smtClean="0"/>
+              <a:t>EL</a:t>
+            </a:r>
+            <a:endParaRPr kumimoji="1" lang="ja-JP" altLang="en-US" b="1" dirty="0"/>
+          </a:p>
+        </p:txBody>
+      </p:sp>
+      <p:sp>
+        <p:nvSpPr>
+          <p:cNvPr id="4" name="スライド番号プレースホルダー 3"/>
+          <p:cNvSpPr>
+            <a:spLocks noGrp="1"/>
+          </p:cNvSpPr>
+          <p:nvPr>
+            <p:ph type="sldNum" sz="quarter" idx="12"/>
+          </p:nvPr>
+        </p:nvSpPr>
+        <p:spPr/>
+        <p:txBody>
+          <a:bodyPr/>
+          <a:lstStyle/>
+          <a:p>
+            <a:fld id="{874224F4-E8E7-214B-AE1E-E0AB1FB5763D}" type="slidenum">
+              <a:rPr lang="ja-JP" altLang="en-US" smtClean="0"/>
+              <a:pPr/>
+              <a:t>7</a:t>
+            </a:fld>
+            <a:endParaRPr lang="ja-JP" altLang="en-US" dirty="0"/>
+          </a:p>
+        </p:txBody>
+      </p:sp>
+      <p:pic>
+        <p:nvPicPr>
+          <p:cNvPr id="5" name="図 4"/>
+          <p:cNvPicPr>
+            <a:picLocks noChangeAspect="1"/>
+          </p:cNvPicPr>
+          <p:nvPr/>
+        </p:nvPicPr>
+        <p:blipFill>
+          <a:blip r:embed="rId3">
+            <a:extLst>
+              <a:ext uri="{28A0092B-C50C-407E-A947-70E740481C1C}">
+                <a14:useLocalDpi xmlns:a14="http://schemas.microsoft.com/office/drawing/2010/main" val="0"/>
+              </a:ext>
+            </a:extLst>
+          </a:blip>
+          <a:stretch>
+            <a:fillRect/>
+          </a:stretch>
+        </p:blipFill>
+        <p:spPr>
+          <a:xfrm>
+            <a:off x="0" y="1545022"/>
+            <a:ext cx="5349737" cy="4344020"/>
+          </a:xfrm>
+          <a:prstGeom prst="rect">
+            <a:avLst/>
+          </a:prstGeom>
+        </p:spPr>
+      </p:pic>
+      <p:pic>
+        <p:nvPicPr>
+          <p:cNvPr id="6" name="図 5"/>
+          <p:cNvPicPr>
+            <a:picLocks noChangeAspect="1"/>
+          </p:cNvPicPr>
+          <p:nvPr/>
+        </p:nvPicPr>
+        <p:blipFill>
+          <a:blip r:embed="rId4">
+            <a:extLst>
+              <a:ext uri="{28A0092B-C50C-407E-A947-70E740481C1C}">
+                <a14:useLocalDpi xmlns:a14="http://schemas.microsoft.com/office/drawing/2010/main" val="0"/>
+              </a:ext>
+            </a:extLst>
+          </a:blip>
+          <a:stretch>
+            <a:fillRect/>
+          </a:stretch>
+        </p:blipFill>
+        <p:spPr>
+          <a:xfrm>
+            <a:off x="5195978" y="1772816"/>
+            <a:ext cx="3816424" cy="3669639"/>
+          </a:xfrm>
+          <a:prstGeom prst="rect">
+            <a:avLst/>
+          </a:prstGeom>
+        </p:spPr>
+      </p:pic>
+    </p:spTree>
+    <p:extLst>
+      <p:ext uri="{BB962C8B-B14F-4D97-AF65-F5344CB8AC3E}">
+        <p14:creationId xmlns:p14="http://schemas.microsoft.com/office/powerpoint/2010/main" val="1166503777"/>
+      </p:ext>
+    </p:extLst>
+  </p:cSld>
+  <p:clrMapOvr>
+    <a:masterClrMapping/>
+  </p:clrMapOvr>
+  <p:timing>
+    <p:tnLst>
+      <p:par>
+        <p:cTn id="1" dur="indefinite" restart="never" nodeType="tmRoot"/>
+      </p:par>
+    </p:tnLst>
+  </p:timing>
+</p:sld>
+</file>
+
+<file path=ppt/slides/slide9.xml><?xml version="1.0" encoding="utf-8"?>
+<p:sld xmlns:a="http://schemas.openxmlformats.org/drawingml/2006/main" xmlns:r="http://schemas.openxmlformats.org/officeDocument/2006/relationships" xmlns:p="http://schemas.openxmlformats.org/presentationml/2006/main">
+  <p:cSld>
+    <p:spTree>
+      <p:nvGrpSpPr>
+        <p:cNvPr id="1" name=""/>
+        <p:cNvGrpSpPr/>
+        <p:nvPr/>
+      </p:nvGrpSpPr>
+      <p:grpSpPr>
+        <a:xfrm>
+          <a:off x="0" y="0"/>
+          <a:ext cx="0" cy="0"/>
+          <a:chOff x="0" y="0"/>
+          <a:chExt cx="0" cy="0"/>
+        </a:xfrm>
+      </p:grpSpPr>
+      <p:sp>
+        <p:nvSpPr>
+          <p:cNvPr id="2" name="タイトル 1"/>
+          <p:cNvSpPr>
+            <a:spLocks noGrp="1"/>
+          </p:cNvSpPr>
+          <p:nvPr>
+            <p:ph type="title"/>
+          </p:nvPr>
+        </p:nvSpPr>
+        <p:spPr/>
+        <p:txBody>
           <a:bodyPr/>
           <a:lstStyle/>
           <a:p>
@@ -6041,7 +6960,7 @@
             </a:r>
             <a:r>
               <a:rPr kumimoji="1" lang="ja-JP" altLang="en-US" dirty="0" smtClean="0"/>
-              <a:t>チーム開発の難しさ</a:t>
+              <a:t>チーム開発</a:t>
             </a:r>
             <a:endParaRPr kumimoji="1" lang="en-US" altLang="ja-JP" dirty="0" smtClean="0"/>
           </a:p>
@@ -6071,7 +6990,7 @@
             </a:r>
             <a:r>
               <a:rPr lang="ja-JP" altLang="en-US" dirty="0" smtClean="0"/>
-              <a:t>時間の使い方</a:t>
+              <a:t>時間</a:t>
             </a:r>
             <a:endParaRPr lang="en-US" altLang="ja-JP" dirty="0"/>
           </a:p>
@@ -6124,7 +7043,7 @@
             </a:r>
             <a:r>
               <a:rPr kumimoji="1" lang="ja-JP" altLang="en-US" dirty="0" smtClean="0"/>
-              <a:t>会社による制約が発生する</a:t>
+              <a:t>会社による制約</a:t>
             </a:r>
             <a:endParaRPr kumimoji="1" lang="en-US" altLang="ja-JP" dirty="0" smtClean="0"/>
           </a:p>
@@ -6134,7 +7053,7 @@
               <a:buChar char="Ø"/>
             </a:pPr>
             <a:r>
-              <a:rPr lang="en-US" altLang="ja-JP" dirty="0"/>
+              <a:rPr lang="en-US" altLang="ja-JP" dirty="0" smtClean="0"/>
               <a:t> </a:t>
             </a:r>
             <a:r>
@@ -6169,7 +7088,7 @@
             <a:fld id="{874224F4-E8E7-214B-AE1E-E0AB1FB5763D}" type="slidenum">
               <a:rPr lang="ja-JP" altLang="en-US" smtClean="0"/>
               <a:pPr/>
-              <a:t>4</a:t>
+              <a:t>8</a:t>
             </a:fld>
             <a:endParaRPr lang="ja-JP" altLang="en-US" dirty="0"/>
           </a:p>
@@ -6185,6 +7104,13 @@
   <p:clrMapOvr>
     <a:masterClrMapping/>
   </p:clrMapOvr>
+  <p:timing>
+    <p:tnLst>
+      <p:par>
+        <p:cTn id="1" dur="indefinite" restart="never" nodeType="tmRoot"/>
+      </p:par>
+    </p:tnLst>
+  </p:timing>
 </p:sld>
 </file>
 

</xml_diff>